<commit_message>
Fix list of covered algorithms
</commit_message>
<xml_diff>
--- a/python_for_machine_learning.pptx
+++ b/python_for_machine_learning.pptx
@@ -260,7 +260,7 @@
           <a:p>
             <a:fld id="{DBF5F7A3-80FA-4DE8-9E10-D5FD6AAF4E4C}" type="datetimeFigureOut">
               <a:rPr lang="en-US" smtClean="0"/>
-              <a:t>2020-01-21</a:t>
+              <a:t>2020-01-23</a:t>
             </a:fld>
             <a:endParaRPr lang="en-US"/>
           </a:p>
@@ -814,7 +814,7 @@
           <a:p>
             <a:fld id="{12D417FB-DB75-4510-8AD7-5416595AADD8}" type="datetime1">
               <a:rPr lang="en-US" smtClean="0"/>
-              <a:t>2020-01-21</a:t>
+              <a:t>2020-01-23</a:t>
             </a:fld>
             <a:endParaRPr lang="en-US"/>
           </a:p>
@@ -3182,7 +3182,7 @@
           <a:p>
             <a:fld id="{EC448E59-F64F-416B-85C7-F58EA54BAF31}" type="datetime1">
               <a:rPr lang="nl-BE" smtClean="0"/>
-              <a:t>21/01/2020</a:t>
+              <a:t>23/01/2020</a:t>
             </a:fld>
             <a:endParaRPr lang="nl-BE"/>
           </a:p>
@@ -3428,7 +3428,7 @@
           <a:p>
             <a:fld id="{9ED5C3B5-60AD-4494-9CFA-8B02B158E887}" type="datetime1">
               <a:rPr lang="nl-BE" smtClean="0"/>
-              <a:t>21/01/2020</a:t>
+              <a:t>23/01/2020</a:t>
             </a:fld>
             <a:endParaRPr lang="nl-BE"/>
           </a:p>
@@ -3546,7 +3546,7 @@
           <a:p>
             <a:fld id="{1E4894A8-27B8-4F4D-B345-90FD4A1447E9}" type="datetime1">
               <a:rPr lang="nl-BE" smtClean="0"/>
-              <a:t>21/01/2020</a:t>
+              <a:t>23/01/2020</a:t>
             </a:fld>
             <a:endParaRPr lang="nl-BE"/>
           </a:p>
@@ -3834,7 +3834,7 @@
           <a:p>
             <a:fld id="{44F0EF99-E673-4972-A23A-EB3FD1F7D254}" type="datetime1">
               <a:rPr lang="nl-BE" smtClean="0"/>
-              <a:t>21/01/2020</a:t>
+              <a:t>23/01/2020</a:t>
             </a:fld>
             <a:endParaRPr lang="nl-BE"/>
           </a:p>
@@ -5923,7 +5923,7 @@
             </a:br>
             <a:r>
               <a:rPr lang="en-BE" dirty="0"/>
-              <a:t>Naive Base, , Support Vector Machines,</a:t>
+              <a:t>Naive Base, Support Vector Machines,</a:t>
             </a:r>
             <a:br>
               <a:rPr lang="en-BE" dirty="0"/>
@@ -5995,48 +5995,6 @@
           <a:xfrm>
             <a:off x="1140823" y="4319453"/>
             <a:ext cx="3230880" cy="383175"/>
-          </a:xfrm>
-          <a:prstGeom prst="rect">
-            <a:avLst/>
-          </a:prstGeom>
-          <a:noFill/>
-          <a:ln w="28575"/>
-        </p:spPr>
-        <p:style>
-          <a:lnRef idx="2">
-            <a:schemeClr val="accent1">
-              <a:shade val="50000"/>
-            </a:schemeClr>
-          </a:lnRef>
-          <a:fillRef idx="1">
-            <a:schemeClr val="accent1"/>
-          </a:fillRef>
-          <a:effectRef idx="0">
-            <a:schemeClr val="accent1"/>
-          </a:effectRef>
-          <a:fontRef idx="minor">
-            <a:schemeClr val="lt1"/>
-          </a:fontRef>
-        </p:style>
-        <p:txBody>
-          <a:bodyPr rtlCol="0" anchor="ctr"/>
-          <a:lstStyle/>
-          <a:p>
-            <a:pPr algn="ctr"/>
-            <a:endParaRPr lang="en-US"/>
-          </a:p>
-        </p:txBody>
-      </p:sp>
-      <p:sp>
-        <p:nvSpPr>
-          <p:cNvPr id="9" name="Rectangle 8"/>
-          <p:cNvSpPr/>
-          <p:nvPr/>
-        </p:nvSpPr>
-        <p:spPr>
-          <a:xfrm>
-            <a:off x="1097279" y="2172137"/>
-            <a:ext cx="2438402" cy="300971"/>
           </a:xfrm>
           <a:prstGeom prst="rect">
             <a:avLst/>
@@ -6110,6 +6068,150 @@
           </a:extLst>
         </p:spPr>
       </p:pic>
+      <p:sp>
+        <p:nvSpPr>
+          <p:cNvPr id="8" name="Rectangle 7">
+            <a:extLst>
+              <a:ext uri="{FF2B5EF4-FFF2-40B4-BE49-F238E27FC236}">
+                <a16:creationId xmlns:a16="http://schemas.microsoft.com/office/drawing/2014/main" id="{537C55D9-AF40-43E1-95B9-7D63F913EEBC}"/>
+              </a:ext>
+            </a:extLst>
+          </p:cNvPr>
+          <p:cNvSpPr/>
+          <p:nvPr/>
+        </p:nvSpPr>
+        <p:spPr>
+          <a:xfrm>
+            <a:off x="1097279" y="5504786"/>
+            <a:ext cx="1247988" cy="383175"/>
+          </a:xfrm>
+          <a:prstGeom prst="rect">
+            <a:avLst/>
+          </a:prstGeom>
+          <a:noFill/>
+          <a:ln w="28575"/>
+        </p:spPr>
+        <p:style>
+          <a:lnRef idx="2">
+            <a:schemeClr val="accent1">
+              <a:shade val="50000"/>
+            </a:schemeClr>
+          </a:lnRef>
+          <a:fillRef idx="1">
+            <a:schemeClr val="accent1"/>
+          </a:fillRef>
+          <a:effectRef idx="0">
+            <a:schemeClr val="accent1"/>
+          </a:effectRef>
+          <a:fontRef idx="minor">
+            <a:schemeClr val="lt1"/>
+          </a:fontRef>
+        </p:style>
+        <p:txBody>
+          <a:bodyPr rtlCol="0" anchor="ctr"/>
+          <a:lstStyle/>
+          <a:p>
+            <a:pPr algn="ctr"/>
+            <a:endParaRPr lang="en-US"/>
+          </a:p>
+        </p:txBody>
+      </p:sp>
+      <p:sp>
+        <p:nvSpPr>
+          <p:cNvPr id="10" name="Rectangle 9">
+            <a:extLst>
+              <a:ext uri="{FF2B5EF4-FFF2-40B4-BE49-F238E27FC236}">
+                <a16:creationId xmlns:a16="http://schemas.microsoft.com/office/drawing/2014/main" id="{F383824E-31B2-4CB1-B877-BB0502CF8221}"/>
+              </a:ext>
+            </a:extLst>
+          </p:cNvPr>
+          <p:cNvSpPr/>
+          <p:nvPr/>
+        </p:nvSpPr>
+        <p:spPr>
+          <a:xfrm>
+            <a:off x="1140823" y="3638680"/>
+            <a:ext cx="1602377" cy="383175"/>
+          </a:xfrm>
+          <a:prstGeom prst="rect">
+            <a:avLst/>
+          </a:prstGeom>
+          <a:noFill/>
+          <a:ln w="28575"/>
+        </p:spPr>
+        <p:style>
+          <a:lnRef idx="2">
+            <a:schemeClr val="accent1">
+              <a:shade val="50000"/>
+            </a:schemeClr>
+          </a:lnRef>
+          <a:fillRef idx="1">
+            <a:schemeClr val="accent1"/>
+          </a:fillRef>
+          <a:effectRef idx="0">
+            <a:schemeClr val="accent1"/>
+          </a:effectRef>
+          <a:fontRef idx="minor">
+            <a:schemeClr val="lt1"/>
+          </a:fontRef>
+        </p:style>
+        <p:txBody>
+          <a:bodyPr rtlCol="0" anchor="ctr"/>
+          <a:lstStyle/>
+          <a:p>
+            <a:pPr algn="ctr"/>
+            <a:endParaRPr lang="en-US"/>
+          </a:p>
+        </p:txBody>
+      </p:sp>
+      <p:sp>
+        <p:nvSpPr>
+          <p:cNvPr id="11" name="Rectangle 10">
+            <a:extLst>
+              <a:ext uri="{FF2B5EF4-FFF2-40B4-BE49-F238E27FC236}">
+                <a16:creationId xmlns:a16="http://schemas.microsoft.com/office/drawing/2014/main" id="{CDC827CC-711B-44B2-A36E-5EF35AD20D4D}"/>
+              </a:ext>
+            </a:extLst>
+          </p:cNvPr>
+          <p:cNvSpPr/>
+          <p:nvPr/>
+        </p:nvSpPr>
+        <p:spPr>
+          <a:xfrm>
+            <a:off x="1097279" y="2153385"/>
+            <a:ext cx="2433321" cy="383175"/>
+          </a:xfrm>
+          <a:prstGeom prst="rect">
+            <a:avLst/>
+          </a:prstGeom>
+          <a:noFill/>
+          <a:ln w="28575"/>
+        </p:spPr>
+        <p:style>
+          <a:lnRef idx="2">
+            <a:schemeClr val="accent1">
+              <a:shade val="50000"/>
+            </a:schemeClr>
+          </a:lnRef>
+          <a:fillRef idx="1">
+            <a:schemeClr val="accent1"/>
+          </a:fillRef>
+          <a:effectRef idx="0">
+            <a:schemeClr val="accent1"/>
+          </a:effectRef>
+          <a:fontRef idx="minor">
+            <a:schemeClr val="lt1"/>
+          </a:fontRef>
+        </p:style>
+        <p:txBody>
+          <a:bodyPr rtlCol="0" anchor="ctr"/>
+          <a:lstStyle/>
+          <a:p>
+            <a:pPr algn="ctr"/>
+            <a:endParaRPr lang="en-US"/>
+          </a:p>
+        </p:txBody>
+      </p:sp>
     </p:spTree>
     <p:extLst>
       <p:ext uri="{BB962C8B-B14F-4D97-AF65-F5344CB8AC3E}">
@@ -6272,26 +6374,35 @@
                                   </p:childTnLst>
                                 </p:cTn>
                               </p:par>
-                            </p:childTnLst>
-                          </p:cTn>
-                        </p:par>
-                      </p:childTnLst>
-                    </p:cTn>
-                  </p:par>
-                  <p:par>
-                    <p:cTn id="15" fill="hold">
-                      <p:stCondLst>
-                        <p:cond delay="indefinite"/>
-                      </p:stCondLst>
-                      <p:childTnLst>
-                        <p:par>
-                          <p:cTn id="16" fill="hold">
-                            <p:stCondLst>
-                              <p:cond delay="0"/>
-                            </p:stCondLst>
-                            <p:childTnLst>
                               <p:par>
-                                <p:cTn id="17" presetID="1" presetClass="entr" presetSubtype="0" fill="hold" grpId="0" nodeType="clickEffect">
+                                <p:cTn id="15" presetID="1" presetClass="entr" presetSubtype="0" fill="hold" grpId="0" nodeType="withEffect">
+                                  <p:stCondLst>
+                                    <p:cond delay="0"/>
+                                  </p:stCondLst>
+                                  <p:childTnLst>
+                                    <p:set>
+                                      <p:cBhvr>
+                                        <p:cTn id="16" dur="1" fill="hold">
+                                          <p:stCondLst>
+                                            <p:cond delay="0"/>
+                                          </p:stCondLst>
+                                        </p:cTn>
+                                        <p:tgtEl>
+                                          <p:spTgt spid="5"/>
+                                        </p:tgtEl>
+                                        <p:attrNameLst>
+                                          <p:attrName>style.visibility</p:attrName>
+                                        </p:attrNameLst>
+                                      </p:cBhvr>
+                                      <p:to>
+                                        <p:strVal val="visible"/>
+                                      </p:to>
+                                    </p:set>
+                                  </p:childTnLst>
+                                </p:cTn>
+                              </p:par>
+                              <p:par>
+                                <p:cTn id="17" presetID="1" presetClass="entr" presetSubtype="0" fill="hold" grpId="0" nodeType="withEffect">
                                   <p:stCondLst>
                                     <p:cond delay="0"/>
                                   </p:stCondLst>
@@ -6304,7 +6415,7 @@
                                           </p:stCondLst>
                                         </p:cTn>
                                         <p:tgtEl>
-                                          <p:spTgt spid="9"/>
+                                          <p:spTgt spid="8"/>
                                         </p:tgtEl>
                                         <p:attrNameLst>
                                           <p:attrName>style.visibility</p:attrName>
@@ -6331,7 +6442,34 @@
                                           </p:stCondLst>
                                         </p:cTn>
                                         <p:tgtEl>
-                                          <p:spTgt spid="5"/>
+                                          <p:spTgt spid="10"/>
+                                        </p:tgtEl>
+                                        <p:attrNameLst>
+                                          <p:attrName>style.visibility</p:attrName>
+                                        </p:attrNameLst>
+                                      </p:cBhvr>
+                                      <p:to>
+                                        <p:strVal val="visible"/>
+                                      </p:to>
+                                    </p:set>
+                                  </p:childTnLst>
+                                </p:cTn>
+                              </p:par>
+                              <p:par>
+                                <p:cTn id="21" presetID="1" presetClass="entr" presetSubtype="0" fill="hold" grpId="0" nodeType="withEffect">
+                                  <p:stCondLst>
+                                    <p:cond delay="0"/>
+                                  </p:stCondLst>
+                                  <p:childTnLst>
+                                    <p:set>
+                                      <p:cBhvr>
+                                        <p:cTn id="22" dur="1" fill="hold">
+                                          <p:stCondLst>
+                                            <p:cond delay="0"/>
+                                          </p:stCondLst>
+                                        </p:cTn>
+                                        <p:tgtEl>
+                                          <p:spTgt spid="11"/>
                                         </p:tgtEl>
                                         <p:attrNameLst>
                                           <p:attrName>style.visibility</p:attrName>
@@ -6374,7 +6512,9 @@
     <p:bldLst>
       <p:bldP spid="3" grpId="0" uiExpand="1" build="p"/>
       <p:bldP spid="5" grpId="0" animBg="1"/>
-      <p:bldP spid="9" grpId="0" animBg="1"/>
+      <p:bldP spid="8" grpId="0" animBg="1"/>
+      <p:bldP spid="10" grpId="0" animBg="1"/>
+      <p:bldP spid="11" grpId="0" animBg="1"/>
     </p:bldLst>
   </p:timing>
 </p:sld>

</xml_diff>

<commit_message>
Fix source code URLs
</commit_message>
<xml_diff>
--- a/python_for_machine_learning.pptx
+++ b/python_for_machine_learning.pptx
@@ -10865,14 +10865,14 @@
           <a:lstStyle/>
           <a:p>
             <a:r>
-              <a:rPr lang="en-US" sz="1800" dirty="0">
+              <a:rPr lang="en-GB" sz="1800" dirty="0">
                 <a:hlinkClick r:id="rId2"/>
               </a:rPr>
-              <a:t>https://github.com/gjbex/training-material/tree/master/Python/ScikitLearn</a:t>
-            </a:r>
-            <a:r>
-              <a:rPr lang="en-US" sz="1800" dirty="0"/>
-              <a:t>  </a:t>
+              <a:t>https://github.com/gjbex/Python-for-machine-learning/tree/master/source-code/scikit-learn</a:t>
+            </a:r>
+            <a:r>
+              <a:rPr lang="en-GB" sz="1800" dirty="0"/>
+              <a:t> </a:t>
             </a:r>
             <a:endParaRPr lang="en-US" sz="2400" dirty="0"/>
           </a:p>
@@ -29338,14 +29338,14 @@
           <a:lstStyle/>
           <a:p>
             <a:r>
-              <a:rPr lang="en-US" sz="1800" dirty="0">
+              <a:rPr lang="en-GB" sz="1800" dirty="0">
                 <a:hlinkClick r:id="rId2"/>
               </a:rPr>
-              <a:t>https://github.com/gjbex/training-material/tree/master/Python/ScikitLearn</a:t>
-            </a:r>
-            <a:r>
-              <a:rPr lang="en-US" sz="1800" dirty="0"/>
-              <a:t>  </a:t>
+              <a:t>https://github.com/gjbex/Python-for-machine-learning/tree/master/source-code/keras</a:t>
+            </a:r>
+            <a:r>
+              <a:rPr lang="en-GB" sz="1800" dirty="0"/>
+              <a:t> </a:t>
             </a:r>
             <a:endParaRPr lang="en-US" sz="2400" dirty="0"/>
           </a:p>

</xml_diff>

<commit_message>
Fix Github pages reference
</commit_message>
<xml_diff>
--- a/python_for_machine_learning.pptx
+++ b/python_for_machine_learning.pptx
@@ -175,6 +175,10 @@
           <p14:sldIdLst>
             <p14:sldId id="257"/>
             <p14:sldId id="281"/>
+          </p14:sldIdLst>
+        </p14:section>
+        <p14:section name="Introduction" id="{857C6A2F-A767-4067-AE01-714D1130F04F}">
+          <p14:sldIdLst>
             <p14:sldId id="258"/>
             <p14:sldId id="259"/>
             <p14:sldId id="260"/>
@@ -13356,72 +13360,6 @@
       </p:grpSpPr>
       <p:sp>
         <p:nvSpPr>
-          <p:cNvPr id="2" name="Title 1"/>
-          <p:cNvSpPr>
-            <a:spLocks noGrp="1"/>
-          </p:cNvSpPr>
-          <p:nvPr>
-            <p:ph type="title"/>
-          </p:nvPr>
-        </p:nvSpPr>
-        <p:spPr/>
-        <p:txBody>
-          <a:bodyPr/>
-          <a:lstStyle/>
-          <a:p>
-            <a:r>
-              <a:rPr lang="en-BE" dirty="0"/>
-              <a:t>Material</a:t>
-            </a:r>
-            <a:endParaRPr lang="en-US" dirty="0"/>
-          </a:p>
-        </p:txBody>
-      </p:sp>
-      <p:sp>
-        <p:nvSpPr>
-          <p:cNvPr id="3" name="Content Placeholder 2"/>
-          <p:cNvSpPr>
-            <a:spLocks noGrp="1"/>
-          </p:cNvSpPr>
-          <p:nvPr>
-            <p:ph idx="1"/>
-          </p:nvPr>
-        </p:nvSpPr>
-        <p:spPr/>
-        <p:txBody>
-          <a:bodyPr/>
-          <a:lstStyle/>
-          <a:p>
-            <a:r>
-              <a:rPr lang="en-BE" dirty="0"/>
-              <a:t>All material available on GitHub</a:t>
-            </a:r>
-          </a:p>
-          <a:p>
-            <a:pPr lvl="1"/>
-            <a:r>
-              <a:rPr lang="en-BE" dirty="0"/>
-              <a:t>this presentation</a:t>
-            </a:r>
-          </a:p>
-          <a:p>
-            <a:pPr lvl="1"/>
-            <a:r>
-              <a:rPr lang="en-BE" dirty="0"/>
-              <a:t>conda environments</a:t>
-            </a:r>
-          </a:p>
-          <a:p>
-            <a:pPr lvl="1"/>
-            <a:r>
-              <a:rPr lang="en-BE" dirty="0"/>
-              <a:t>Jupyter notebooks</a:t>
-            </a:r>
-          </a:p>
-        </p:txBody>
-      </p:sp>
-      <p:sp>
-        <p:nvSpPr>
           <p:cNvPr id="4" name="Slide Number Placeholder 3"/>
           <p:cNvSpPr>
             <a:spLocks noGrp="1"/>
@@ -13445,14 +13383,20 @@
       </p:sp>
       <p:sp>
         <p:nvSpPr>
-          <p:cNvPr id="5" name="TextBox 4"/>
+          <p:cNvPr id="6" name="TextBox 5">
+            <a:extLst>
+              <a:ext uri="{FF2B5EF4-FFF2-40B4-BE49-F238E27FC236}">
+                <a16:creationId xmlns:a16="http://schemas.microsoft.com/office/drawing/2014/main" id="{15121924-8AEA-4C8F-95FA-4768DA10573C}"/>
+              </a:ext>
+            </a:extLst>
+          </p:cNvPr>
           <p:cNvSpPr txBox="1"/>
           <p:nvPr/>
         </p:nvSpPr>
         <p:spPr>
           <a:xfrm>
-            <a:off x="2393705" y="4001294"/>
-            <a:ext cx="7404591" cy="1754326"/>
+            <a:off x="4048805" y="5244860"/>
+            <a:ext cx="4094391" cy="584775"/>
           </a:xfrm>
           <a:prstGeom prst="rect">
             <a:avLst/>
@@ -13465,82 +13409,54 @@
           </a:bodyPr>
           <a:lstStyle/>
           <a:p>
-            <a:pPr algn="ctr"/>
-            <a:r>
-              <a:rPr lang="en-US" sz="3600" dirty="0">
+            <a:r>
+              <a:rPr lang="en-GB" sz="3200" dirty="0">
                 <a:hlinkClick r:id="rId2"/>
               </a:rPr>
-              <a:t>https://github.com/gjbex/PRACE_ML</a:t>
-            </a:r>
-            <a:br>
-              <a:rPr lang="en-BE" sz="3600" dirty="0"/>
-            </a:br>
-            <a:r>
-              <a:rPr lang="en-BE" sz="3600" dirty="0"/>
-              <a:t>or</a:t>
-            </a:r>
-            <a:br>
-              <a:rPr lang="en-BE" sz="3600" dirty="0"/>
-            </a:br>
-            <a:r>
-              <a:rPr lang="en-BE" sz="3600" dirty="0">
-                <a:hlinkClick r:id="rId3"/>
-              </a:rPr>
-              <a:t>https://</a:t>
-            </a:r>
-            <a:r>
-              <a:rPr lang="en-US" sz="3600" dirty="0">
-                <a:hlinkClick r:id="rId3"/>
-              </a:rPr>
-              <a:t>bit.ly/prace2019_ml</a:t>
-            </a:r>
-            <a:r>
-              <a:rPr lang="en-BE" sz="3600" dirty="0"/>
+              <a:t>http://bit.ly/2RYQvSX</a:t>
+            </a:r>
+            <a:r>
+              <a:rPr lang="en-GB" sz="3200" dirty="0"/>
               <a:t> </a:t>
             </a:r>
-            <a:endParaRPr lang="en-US" sz="3600" dirty="0"/>
+            <a:endParaRPr lang="en-BE" sz="3200" dirty="0"/>
           </a:p>
         </p:txBody>
       </p:sp>
       <p:pic>
         <p:nvPicPr>
-          <p:cNvPr id="1030" name="Picture 6" descr="GitHub Logomark"/>
+          <p:cNvPr id="8" name="Picture 7">
+            <a:extLst>
+              <a:ext uri="{FF2B5EF4-FFF2-40B4-BE49-F238E27FC236}">
+                <a16:creationId xmlns:a16="http://schemas.microsoft.com/office/drawing/2014/main" id="{D80566D8-E72D-465B-99AE-C31E8CF7098E}"/>
+              </a:ext>
+            </a:extLst>
+          </p:cNvPr>
           <p:cNvPicPr>
-            <a:picLocks noChangeAspect="1" noChangeArrowheads="1"/>
+            <a:picLocks noChangeAspect="1"/>
           </p:cNvPicPr>
           <p:nvPr/>
         </p:nvPicPr>
         <p:blipFill>
-          <a:blip r:embed="rId4" cstate="print">
+          <a:blip r:embed="rId3">
             <a:extLst>
               <a:ext uri="{28A0092B-C50C-407E-A947-70E740481C1C}">
                 <a14:useLocalDpi xmlns:a14="http://schemas.microsoft.com/office/drawing/2010/main" val="0"/>
               </a:ext>
             </a:extLst>
           </a:blip>
-          <a:srcRect/>
           <a:stretch>
             <a:fillRect/>
           </a:stretch>
         </p:blipFill>
-        <p:spPr bwMode="auto">
+        <p:spPr>
           <a:xfrm>
-            <a:off x="7916091" y="1364799"/>
-            <a:ext cx="2215152" cy="2215152"/>
+            <a:off x="3537839" y="188349"/>
+            <a:ext cx="5116323" cy="5116323"/>
           </a:xfrm>
           <a:prstGeom prst="rect">
             <a:avLst/>
           </a:prstGeom>
-          <a:noFill/>
-          <a:extLst>
-            <a:ext uri="{909E8E84-426E-40DD-AFC4-6F175D3DCCD1}">
-              <a14:hiddenFill xmlns:a14="http://schemas.microsoft.com/office/drawing/2010/main">
-                <a:solidFill>
-                  <a:srgbClr val="FFFFFF"/>
-                </a:solidFill>
-              </a14:hiddenFill>
-            </a:ext>
-          </a:extLst>
         </p:spPr>
       </p:pic>
     </p:spTree>

</xml_diff>